<commit_message>
clean up compute utility slides
</commit_message>
<xml_diff>
--- a/PRESENTATIONS/2020-10-joint-wot-wn/2020-10-15-WoT-Compute-Utility-McCool.pptx
+++ b/PRESENTATIONS/2020-10-joint-wot-wn/2020-10-15-WoT-Compute-Utility-McCool.pptx
@@ -253,7 +253,7 @@
                 <a:latin typeface="Arial" panose="020B0604020202020204" pitchFamily="34" charset="0"/>
               </a:rPr>
               <a:pPr/>
-              <a:t>10/15/20</a:t>
+              <a:t>10/19/20</a:t>
             </a:fld>
             <a:endParaRPr lang="en-US" dirty="0">
               <a:latin typeface="Arial" panose="020B0604020202020204" pitchFamily="34" charset="0"/>
@@ -433,7 +433,7 @@
             <a:fld id="{ED7FC5FE-6F0D-D34A-8EE6-C95B4F5F4DC8}" type="datetimeFigureOut">
               <a:rPr lang="en-US" smtClean="0"/>
               <a:pPr/>
-              <a:t>10/15/20</a:t>
+              <a:t>10/19/20</a:t>
             </a:fld>
             <a:endParaRPr lang="en-US" dirty="0"/>
           </a:p>
@@ -750,35 +750,7 @@
           <a:bodyPr/>
           <a:lstStyle/>
           <a:p>
-            <a:r>
-              <a:rPr lang="en-US" dirty="0"/>
-              <a:t>Next steps: update, bring in Doug Sommers, Paul Peterson, Kenneth Torrance, </a:t>
-            </a:r>
-            <a:r>
-              <a:rPr lang="en-US" dirty="0" err="1"/>
-              <a:t>Anssi</a:t>
-            </a:r>
-            <a:r>
-              <a:rPr lang="en-US" dirty="0"/>
-              <a:t>, </a:t>
-            </a:r>
-            <a:r>
-              <a:rPr lang="en-US" dirty="0" err="1"/>
-              <a:t>Rijubrata</a:t>
-            </a:r>
-            <a:r>
-              <a:rPr lang="en-US" dirty="0"/>
-              <a:t> ...</a:t>
-            </a:r>
-          </a:p>
-          <a:p>
             <a:endParaRPr lang="en-US" dirty="0"/>
-          </a:p>
-          <a:p>
-            <a:r>
-              <a:rPr lang="en-US" dirty="0"/>
-              <a:t>To do: look at worklets, perhaps a bit more flexible</a:t>
-            </a:r>
           </a:p>
         </p:txBody>
       </p:sp>
@@ -929,14 +901,6 @@
               <a:buSzPts val="1400"/>
               <a:buNone/>
             </a:pPr>
-            <a:r>
-              <a:rPr lang="en-US" dirty="0"/>
-              <a:t>Need to add citations to images here, they are both cc, now</a:t>
-            </a:r>
-            <a:r>
-              <a:rPr lang="en-US" baseline="0" dirty="0"/>
-              <a:t> I have to find them again…</a:t>
-            </a:r>
             <a:endParaRPr dirty="0"/>
           </a:p>
         </p:txBody>
@@ -1299,60 +1263,6 @@
               <a:buSzPts val="1400"/>
               <a:buNone/>
             </a:pPr>
-            <a:r>
-              <a:rPr lang="en-US" dirty="0"/>
-              <a:t>We could mention, or merge with the concept of “mobile worker”, one that can be migrated across nodes, like in </a:t>
-            </a:r>
-          </a:p>
-          <a:p>
-            <a:pPr marL="0" lvl="0" indent="0" algn="l" rtl="0">
-              <a:lnSpc>
-                <a:spcPct val="100000"/>
-              </a:lnSpc>
-              <a:spcBef>
-                <a:spcPts val="0"/>
-              </a:spcBef>
-              <a:spcAft>
-                <a:spcPts val="0"/>
-              </a:spcAft>
-              <a:buSzPts val="1400"/>
-              <a:buNone/>
-            </a:pPr>
-            <a:r>
-              <a:rPr lang="en-US" dirty="0"/>
-              <a:t>https://</a:t>
-            </a:r>
-            <a:r>
-              <a:rPr lang="en-US" dirty="0" err="1"/>
-              <a:t>dl.acm.org</a:t>
-            </a:r>
-            <a:r>
-              <a:rPr lang="en-US" dirty="0"/>
-              <a:t>/</a:t>
-            </a:r>
-            <a:r>
-              <a:rPr lang="en-US" dirty="0" err="1"/>
-              <a:t>doi</a:t>
-            </a:r>
-            <a:r>
-              <a:rPr lang="en-US" dirty="0"/>
-              <a:t>/pdf/10.1145/3357223.3362735 </a:t>
-            </a:r>
-          </a:p>
-          <a:p>
-            <a:pPr marL="0" lvl="0" indent="0" algn="l" rtl="0">
-              <a:lnSpc>
-                <a:spcPct val="100000"/>
-              </a:lnSpc>
-              <a:spcBef>
-                <a:spcPts val="0"/>
-              </a:spcBef>
-              <a:spcAft>
-                <a:spcPts val="0"/>
-              </a:spcAft>
-              <a:buSzPts val="1400"/>
-              <a:buNone/>
-            </a:pPr>
             <a:endParaRPr dirty="0"/>
           </a:p>
         </p:txBody>
@@ -1468,63 +1378,6 @@
           <a:bodyPr/>
           <a:lstStyle/>
           <a:p>
-            <a:r>
-              <a:rPr lang="en-US" dirty="0"/>
-              <a:t>Peng, Ding, </a:t>
-            </a:r>
-            <a:r>
-              <a:rPr lang="en-US" dirty="0" err="1"/>
-              <a:t>Xintian</a:t>
-            </a:r>
-            <a:r>
-              <a:rPr lang="en-US" dirty="0"/>
-              <a:t> are interested in metadata and metric issues</a:t>
-            </a:r>
-          </a:p>
-          <a:p>
-            <a:r>
-              <a:rPr lang="en-US" dirty="0"/>
-              <a:t>once you get metadata, how do you aggregate, summarize, and get insight from metadata</a:t>
-            </a:r>
-          </a:p>
-          <a:p>
-            <a:r>
-              <a:rPr lang="en-US" dirty="0"/>
-              <a:t>    - McCool: working on </a:t>
-            </a:r>
-            <a:r>
-              <a:rPr lang="en-US" dirty="0" err="1"/>
-              <a:t>sparql</a:t>
-            </a:r>
-            <a:r>
-              <a:rPr lang="en-US" dirty="0"/>
-              <a:t>, json-</a:t>
-            </a:r>
-            <a:r>
-              <a:rPr lang="en-US" dirty="0" err="1"/>
-              <a:t>ld</a:t>
-            </a:r>
-            <a:r>
-              <a:rPr lang="en-US" dirty="0"/>
-              <a:t>, etc.</a:t>
-            </a:r>
-          </a:p>
-          <a:p>
-            <a:endParaRPr lang="en-US" dirty="0"/>
-          </a:p>
-          <a:p>
-            <a:r>
-              <a:rPr lang="en-US" dirty="0"/>
-              <a:t>ZK: IMHO Wot Scripting could be updated from edge workers work, rather than vice versa. Currently WoT Scripting is not chartered to support IoT orchestration, that would be a different API. </a:t>
-            </a:r>
-          </a:p>
-          <a:p>
-            <a:r>
-              <a:rPr lang="en-US" dirty="0"/>
-              <a:t>The orchestration API is a big topic, let’s not carve that in stone yet.</a:t>
-            </a:r>
-          </a:p>
-          <a:p>
             <a:endParaRPr lang="en-US" dirty="0"/>
           </a:p>
           <a:p>
@@ -1616,63 +1469,6 @@
           <a:bodyPr/>
           <a:lstStyle/>
           <a:p>
-            <a:r>
-              <a:rPr lang="en-US" dirty="0"/>
-              <a:t>Peng, Ding, </a:t>
-            </a:r>
-            <a:r>
-              <a:rPr lang="en-US" dirty="0" err="1"/>
-              <a:t>Xintian</a:t>
-            </a:r>
-            <a:r>
-              <a:rPr lang="en-US" dirty="0"/>
-              <a:t> are interested in metadata and metric issues</a:t>
-            </a:r>
-          </a:p>
-          <a:p>
-            <a:r>
-              <a:rPr lang="en-US" dirty="0"/>
-              <a:t>once you get metadata, how do you aggregate, summarize, and get insight from metadata</a:t>
-            </a:r>
-          </a:p>
-          <a:p>
-            <a:r>
-              <a:rPr lang="en-US" dirty="0"/>
-              <a:t>    - McCool: working on </a:t>
-            </a:r>
-            <a:r>
-              <a:rPr lang="en-US" dirty="0" err="1"/>
-              <a:t>sparql</a:t>
-            </a:r>
-            <a:r>
-              <a:rPr lang="en-US" dirty="0"/>
-              <a:t>, json-</a:t>
-            </a:r>
-            <a:r>
-              <a:rPr lang="en-US" dirty="0" err="1"/>
-              <a:t>ld</a:t>
-            </a:r>
-            <a:r>
-              <a:rPr lang="en-US" dirty="0"/>
-              <a:t>, etc.</a:t>
-            </a:r>
-          </a:p>
-          <a:p>
-            <a:endParaRPr lang="en-US" dirty="0"/>
-          </a:p>
-          <a:p>
-            <a:r>
-              <a:rPr lang="en-US" dirty="0"/>
-              <a:t>ZK: IMHO Wot Scripting could be updated from edge workers work, rather than vice versa. Currently WoT Scripting is not chartered to support IoT orchestration, that would be a different API. </a:t>
-            </a:r>
-          </a:p>
-          <a:p>
-            <a:r>
-              <a:rPr lang="en-US" dirty="0"/>
-              <a:t>The orchestration API is a big topic, let’s not carve that in stone yet.</a:t>
-            </a:r>
-          </a:p>
-          <a:p>
             <a:endParaRPr lang="en-US" dirty="0"/>
           </a:p>
           <a:p>
@@ -1764,10 +1560,7 @@
           <a:bodyPr/>
           <a:lstStyle/>
           <a:p>
-            <a:r>
-              <a:rPr lang="en-US" dirty="0"/>
-              <a:t>A list of metadata for workloads</a:t>
-            </a:r>
+            <a:endParaRPr lang="en-US" dirty="0"/>
           </a:p>
         </p:txBody>
       </p:sp>
@@ -1852,10 +1645,7 @@
           <a:bodyPr/>
           <a:lstStyle/>
           <a:p>
-            <a:r>
-              <a:rPr lang="en-US" dirty="0"/>
-              <a:t>API includes both IDL for the script API, and the network API (used only by the browser)</a:t>
-            </a:r>
+            <a:endParaRPr lang="en-US" dirty="0"/>
           </a:p>
         </p:txBody>
       </p:sp>
@@ -2135,7 +1925,7 @@
           <a:noFill/>
           <a:extLst>
             <a:ext uri="{909E8E84-426E-40dd-AFC4-6F175D3DCCD1}">
-              <a14:hiddenFill xmlns:a14="http://schemas.microsoft.com/office/drawing/2010/main" xmlns="">
+              <a14:hiddenFill xmlns="" xmlns:a14="http://schemas.microsoft.com/office/drawing/2010/main">
                 <a:solidFill>
                   <a:srgbClr val="FFFFFF"/>
                 </a:solidFill>
@@ -3396,7 +3186,7 @@
           <a:noFill/>
           <a:extLst>
             <a:ext uri="{909E8E84-426E-40dd-AFC4-6F175D3DCCD1}">
-              <a14:hiddenFill xmlns:a14="http://schemas.microsoft.com/office/drawing/2010/main" xmlns="">
+              <a14:hiddenFill xmlns="" xmlns:a14="http://schemas.microsoft.com/office/drawing/2010/main">
                 <a:solidFill>
                   <a:srgbClr val="FFFFFF"/>
                 </a:solidFill>
@@ -4529,7 +4319,7 @@
           <a:noFill/>
           <a:extLst>
             <a:ext uri="{909E8E84-426E-40dd-AFC4-6F175D3DCCD1}">
-              <a14:hiddenFill xmlns:a14="http://schemas.microsoft.com/office/drawing/2010/main" xmlns="">
+              <a14:hiddenFill xmlns="" xmlns:a14="http://schemas.microsoft.com/office/drawing/2010/main">
                 <a:solidFill>
                   <a:srgbClr val="FFFFFF"/>
                 </a:solidFill>
@@ -6736,7 +6526,7 @@
           <a:noFill/>
           <a:extLst>
             <a:ext uri="{909E8E84-426E-40dd-AFC4-6F175D3DCCD1}">
-              <a14:hiddenFill xmlns:a14="http://schemas.microsoft.com/office/drawing/2010/main" xmlns="">
+              <a14:hiddenFill xmlns="" xmlns:a14="http://schemas.microsoft.com/office/drawing/2010/main">
                 <a:solidFill>
                   <a:srgbClr val="FFFFFF"/>
                 </a:solidFill>
@@ -7286,22 +7076,13 @@
               </a:lnSpc>
             </a:pPr>
             <a:r>
-              <a:rPr lang="en-US">
+              <a:rPr lang="en-US" dirty="0">
                 <a:solidFill>
                   <a:srgbClr val="FFFFFF"/>
                 </a:solidFill>
                 <a:cs typeface="Arial"/>
               </a:rPr>
-              <a:t>Compute </a:t>
-            </a:r>
-            <a:r>
-              <a:rPr lang="en-US" dirty="0">
-                <a:solidFill>
-                  <a:srgbClr val="FFFFFF"/>
-                </a:solidFill>
-                <a:cs typeface="Arial"/>
-              </a:rPr>
-              <a:t>Utilities</a:t>
+              <a:t>Compute Utilities</a:t>
             </a:r>
             <a:endParaRPr lang="en-US" dirty="0"/>
           </a:p>
@@ -13509,9 +13290,12 @@
 </file>
 
 <file path=customXml/item1.xml><?xml version="1.0" encoding="utf-8"?>
-<p:properties xmlns:p="http://schemas.microsoft.com/office/2006/metadata/properties" xmlns:xsi="http://www.w3.org/2001/XMLSchema-instance" xmlns:pc="http://schemas.microsoft.com/office/infopath/2007/PartnerControls">
-  <documentManagement/>
-</p:properties>
+<?mso-contentType ?>
+<FormTemplates xmlns="http://schemas.microsoft.com/sharepoint/v3/contenttype/forms">
+  <Display>DocumentLibraryForm</Display>
+  <Edit>DocumentLibraryForm</Edit>
+  <New>DocumentLibraryForm</New>
+</FormTemplates>
 </file>
 
 <file path=customXml/item2.xml><?xml version="1.0" encoding="utf-8"?>
@@ -13738,27 +13522,15 @@
 </file>
 
 <file path=customXml/item3.xml><?xml version="1.0" encoding="utf-8"?>
-<?mso-contentType ?>
-<FormTemplates xmlns="http://schemas.microsoft.com/sharepoint/v3/contenttype/forms">
-  <Display>DocumentLibraryForm</Display>
-  <Edit>DocumentLibraryForm</Edit>
-  <New>DocumentLibraryForm</New>
-</FormTemplates>
+<p:properties xmlns:p="http://schemas.microsoft.com/office/2006/metadata/properties" xmlns:xsi="http://www.w3.org/2001/XMLSchema-instance" xmlns:pc="http://schemas.microsoft.com/office/infopath/2007/PartnerControls">
+  <documentManagement/>
+</p:properties>
 </file>
 
 <file path=customXml/itemProps1.xml><?xml version="1.0" encoding="utf-8"?>
-<ds:datastoreItem xmlns:ds="http://schemas.openxmlformats.org/officeDocument/2006/customXml" ds:itemID="{139DE561-6E88-4E87-A48D-83EC1F7B5CBB}">
+<ds:datastoreItem xmlns:ds="http://schemas.openxmlformats.org/officeDocument/2006/customXml" ds:itemID="{68A48388-CFE8-49E4-A072-637960D215D9}">
   <ds:schemaRefs>
-    <ds:schemaRef ds:uri="f66673be-3b20-4ac8-ba7c-00310aa8f626"/>
-    <ds:schemaRef ds:uri="http://purl.org/dc/terms/"/>
-    <ds:schemaRef ds:uri="http://schemas.microsoft.com/office/2006/documentManagement/types"/>
-    <ds:schemaRef ds:uri="http://schemas.openxmlformats.org/package/2006/metadata/core-properties"/>
-    <ds:schemaRef ds:uri="96e2f25c-537a-4a0c-91fb-0331a5612536"/>
-    <ds:schemaRef ds:uri="http://purl.org/dc/elements/1.1/"/>
-    <ds:schemaRef ds:uri="http://schemas.microsoft.com/office/2006/metadata/properties"/>
-    <ds:schemaRef ds:uri="http://schemas.microsoft.com/office/infopath/2007/PartnerControls"/>
-    <ds:schemaRef ds:uri="http://www.w3.org/XML/1998/namespace"/>
-    <ds:schemaRef ds:uri="http://purl.org/dc/dcmitype/"/>
+    <ds:schemaRef ds:uri="http://schemas.microsoft.com/sharepoint/v3/contenttype/forms"/>
   </ds:schemaRefs>
 </ds:datastoreItem>
 </file>
@@ -13783,9 +13555,18 @@
 </file>
 
 <file path=customXml/itemProps3.xml><?xml version="1.0" encoding="utf-8"?>
-<ds:datastoreItem xmlns:ds="http://schemas.openxmlformats.org/officeDocument/2006/customXml" ds:itemID="{68A48388-CFE8-49E4-A072-637960D215D9}">
+<ds:datastoreItem xmlns:ds="http://schemas.openxmlformats.org/officeDocument/2006/customXml" ds:itemID="{139DE561-6E88-4E87-A48D-83EC1F7B5CBB}">
   <ds:schemaRefs>
-    <ds:schemaRef ds:uri="http://schemas.microsoft.com/sharepoint/v3/contenttype/forms"/>
+    <ds:schemaRef ds:uri="f66673be-3b20-4ac8-ba7c-00310aa8f626"/>
+    <ds:schemaRef ds:uri="http://purl.org/dc/terms/"/>
+    <ds:schemaRef ds:uri="http://schemas.microsoft.com/office/2006/documentManagement/types"/>
+    <ds:schemaRef ds:uri="http://schemas.openxmlformats.org/package/2006/metadata/core-properties"/>
+    <ds:schemaRef ds:uri="96e2f25c-537a-4a0c-91fb-0331a5612536"/>
+    <ds:schemaRef ds:uri="http://purl.org/dc/elements/1.1/"/>
+    <ds:schemaRef ds:uri="http://schemas.microsoft.com/office/2006/metadata/properties"/>
+    <ds:schemaRef ds:uri="http://schemas.microsoft.com/office/infopath/2007/PartnerControls"/>
+    <ds:schemaRef ds:uri="http://www.w3.org/XML/1998/namespace"/>
+    <ds:schemaRef ds:uri="http://purl.org/dc/dcmitype/"/>
   </ds:schemaRefs>
 </ds:datastoreItem>
 </file>
</xml_diff>